<commit_message>
Updated with subtitle and text clip generator
</commit_message>
<xml_diff>
--- a/02. Frontend/Frontend Ideation.pptx
+++ b/02. Frontend/Frontend Ideation.pptx
@@ -114,12 +114,12 @@
   <pc:docChgLst>
     <pc:chgData name="Niranjan Cholendiran" userId="993aedeb-ae52-459d-8c79-f08198f96874" providerId="ADAL" clId="{2C53EDB7-523E-4846-9E1A-0B93AEFA01D9}"/>
     <pc:docChg chg="modSld">
-      <pc:chgData name="Niranjan Cholendiran" userId="993aedeb-ae52-459d-8c79-f08198f96874" providerId="ADAL" clId="{2C53EDB7-523E-4846-9E1A-0B93AEFA01D9}" dt="2024-07-06T18:29:23.247" v="8" actId="1076"/>
+      <pc:chgData name="Niranjan Cholendiran" userId="993aedeb-ae52-459d-8c79-f08198f96874" providerId="ADAL" clId="{2C53EDB7-523E-4846-9E1A-0B93AEFA01D9}" dt="2024-07-06T18:36:41.789" v="11" actId="1076"/>
       <pc:docMkLst>
         <pc:docMk/>
       </pc:docMkLst>
       <pc:sldChg chg="addSp modSp mod">
-        <pc:chgData name="Niranjan Cholendiran" userId="993aedeb-ae52-459d-8c79-f08198f96874" providerId="ADAL" clId="{2C53EDB7-523E-4846-9E1A-0B93AEFA01D9}" dt="2024-07-06T18:29:23.247" v="8" actId="1076"/>
+        <pc:chgData name="Niranjan Cholendiran" userId="993aedeb-ae52-459d-8c79-f08198f96874" providerId="ADAL" clId="{2C53EDB7-523E-4846-9E1A-0B93AEFA01D9}" dt="2024-07-06T18:36:41.789" v="11" actId="1076"/>
         <pc:sldMkLst>
           <pc:docMk/>
           <pc:sldMk cId="3392650011" sldId="258"/>
@@ -146,6 +146,14 @@
             <pc:docMk/>
             <pc:sldMk cId="3392650011" sldId="258"/>
             <ac:picMk id="11" creationId="{67F9DEDF-EBDE-6BA7-3181-A547F7B774B6}"/>
+          </ac:picMkLst>
+        </pc:picChg>
+        <pc:picChg chg="add mod">
+          <ac:chgData name="Niranjan Cholendiran" userId="993aedeb-ae52-459d-8c79-f08198f96874" providerId="ADAL" clId="{2C53EDB7-523E-4846-9E1A-0B93AEFA01D9}" dt="2024-07-06T18:36:41.789" v="11" actId="1076"/>
+          <ac:picMkLst>
+            <pc:docMk/>
+            <pc:sldMk cId="3392650011" sldId="258"/>
+            <ac:picMk id="13" creationId="{22A88B93-0349-7D1E-0B4F-B36F6B8CABF3}"/>
           </ac:picMkLst>
         </pc:picChg>
       </pc:sldChg>
@@ -3837,6 +3845,36 @@
           <a:xfrm>
             <a:off x="6799691" y="2318326"/>
             <a:ext cx="3517682" cy="2596989"/>
+          </a:xfrm>
+          <a:prstGeom prst="rect">
+            <a:avLst/>
+          </a:prstGeom>
+        </p:spPr>
+      </p:pic>
+      <p:pic>
+        <p:nvPicPr>
+          <p:cNvPr id="13" name="Picture 12">
+            <a:extLst>
+              <a:ext uri="{FF2B5EF4-FFF2-40B4-BE49-F238E27FC236}">
+                <a16:creationId xmlns:a16="http://schemas.microsoft.com/office/drawing/2014/main" id="{22A88B93-0349-7D1E-0B4F-B36F6B8CABF3}"/>
+              </a:ext>
+            </a:extLst>
+          </p:cNvPr>
+          <p:cNvPicPr>
+            <a:picLocks noChangeAspect="1"/>
+          </p:cNvPicPr>
+          <p:nvPr/>
+        </p:nvPicPr>
+        <p:blipFill>
+          <a:blip r:embed="rId5"/>
+          <a:stretch>
+            <a:fillRect/>
+          </a:stretch>
+        </p:blipFill>
+        <p:spPr>
+          <a:xfrm>
+            <a:off x="6216888" y="5048280"/>
+            <a:ext cx="3701123" cy="1613832"/>
           </a:xfrm>
           <a:prstGeom prst="rect">
             <a:avLst/>

</xml_diff>